<commit_message>
Tweeked Part 1, finished Part 2 A & B and put all parts onto the final submission document.
</commit_message>
<xml_diff>
--- a/Part 2 B DB Assignment.pptx
+++ b/Part 2 B DB Assignment.pptx
@@ -243,7 +243,7 @@
           <a:p>
             <a:fld id="{85150B4D-E95D-4F1D-993F-B7CE7B2E3252}" type="datetimeFigureOut">
               <a:rPr lang="en-GB" smtClean="0"/>
-              <a:t>15/05/2020</a:t>
+              <a:t>19/05/2020</a:t>
             </a:fld>
             <a:endParaRPr lang="en-GB"/>
           </a:p>
@@ -413,7 +413,7 @@
           <a:p>
             <a:fld id="{85150B4D-E95D-4F1D-993F-B7CE7B2E3252}" type="datetimeFigureOut">
               <a:rPr lang="en-GB" smtClean="0"/>
-              <a:t>15/05/2020</a:t>
+              <a:t>19/05/2020</a:t>
             </a:fld>
             <a:endParaRPr lang="en-GB"/>
           </a:p>
@@ -593,7 +593,7 @@
           <a:p>
             <a:fld id="{85150B4D-E95D-4F1D-993F-B7CE7B2E3252}" type="datetimeFigureOut">
               <a:rPr lang="en-GB" smtClean="0"/>
-              <a:t>15/05/2020</a:t>
+              <a:t>19/05/2020</a:t>
             </a:fld>
             <a:endParaRPr lang="en-GB"/>
           </a:p>
@@ -763,7 +763,7 @@
           <a:p>
             <a:fld id="{85150B4D-E95D-4F1D-993F-B7CE7B2E3252}" type="datetimeFigureOut">
               <a:rPr lang="en-GB" smtClean="0"/>
-              <a:t>15/05/2020</a:t>
+              <a:t>19/05/2020</a:t>
             </a:fld>
             <a:endParaRPr lang="en-GB"/>
           </a:p>
@@ -1009,7 +1009,7 @@
           <a:p>
             <a:fld id="{85150B4D-E95D-4F1D-993F-B7CE7B2E3252}" type="datetimeFigureOut">
               <a:rPr lang="en-GB" smtClean="0"/>
-              <a:t>15/05/2020</a:t>
+              <a:t>19/05/2020</a:t>
             </a:fld>
             <a:endParaRPr lang="en-GB"/>
           </a:p>
@@ -1241,7 +1241,7 @@
           <a:p>
             <a:fld id="{85150B4D-E95D-4F1D-993F-B7CE7B2E3252}" type="datetimeFigureOut">
               <a:rPr lang="en-GB" smtClean="0"/>
-              <a:t>15/05/2020</a:t>
+              <a:t>19/05/2020</a:t>
             </a:fld>
             <a:endParaRPr lang="en-GB"/>
           </a:p>
@@ -1608,7 +1608,7 @@
           <a:p>
             <a:fld id="{85150B4D-E95D-4F1D-993F-B7CE7B2E3252}" type="datetimeFigureOut">
               <a:rPr lang="en-GB" smtClean="0"/>
-              <a:t>15/05/2020</a:t>
+              <a:t>19/05/2020</a:t>
             </a:fld>
             <a:endParaRPr lang="en-GB"/>
           </a:p>
@@ -1726,7 +1726,7 @@
           <a:p>
             <a:fld id="{85150B4D-E95D-4F1D-993F-B7CE7B2E3252}" type="datetimeFigureOut">
               <a:rPr lang="en-GB" smtClean="0"/>
-              <a:t>15/05/2020</a:t>
+              <a:t>19/05/2020</a:t>
             </a:fld>
             <a:endParaRPr lang="en-GB"/>
           </a:p>
@@ -1821,7 +1821,7 @@
           <a:p>
             <a:fld id="{85150B4D-E95D-4F1D-993F-B7CE7B2E3252}" type="datetimeFigureOut">
               <a:rPr lang="en-GB" smtClean="0"/>
-              <a:t>15/05/2020</a:t>
+              <a:t>19/05/2020</a:t>
             </a:fld>
             <a:endParaRPr lang="en-GB"/>
           </a:p>
@@ -2098,7 +2098,7 @@
           <a:p>
             <a:fld id="{85150B4D-E95D-4F1D-993F-B7CE7B2E3252}" type="datetimeFigureOut">
               <a:rPr lang="en-GB" smtClean="0"/>
-              <a:t>15/05/2020</a:t>
+              <a:t>19/05/2020</a:t>
             </a:fld>
             <a:endParaRPr lang="en-GB"/>
           </a:p>
@@ -2351,7 +2351,7 @@
           <a:p>
             <a:fld id="{85150B4D-E95D-4F1D-993F-B7CE7B2E3252}" type="datetimeFigureOut">
               <a:rPr lang="en-GB" smtClean="0"/>
-              <a:t>15/05/2020</a:t>
+              <a:t>19/05/2020</a:t>
             </a:fld>
             <a:endParaRPr lang="en-GB"/>
           </a:p>
@@ -2564,7 +2564,7 @@
           <a:p>
             <a:fld id="{85150B4D-E95D-4F1D-993F-B7CE7B2E3252}" type="datetimeFigureOut">
               <a:rPr lang="en-GB" smtClean="0"/>
-              <a:t>15/05/2020</a:t>
+              <a:t>19/05/2020</a:t>
             </a:fld>
             <a:endParaRPr lang="en-GB"/>
           </a:p>
@@ -3798,9 +3798,9 @@
           <p:nvPr/>
         </p:nvGrpSpPr>
         <p:grpSpPr>
-          <a:xfrm rot="5400000">
-            <a:off x="6715168" y="3379263"/>
-            <a:ext cx="267346" cy="881726"/>
+          <a:xfrm rot="10800000">
+            <a:off x="10202607" y="4245075"/>
+            <a:ext cx="441321" cy="1056092"/>
             <a:chOff x="5428281" y="3837709"/>
             <a:chExt cx="267346" cy="651279"/>
           </a:xfrm>
@@ -6183,8 +6183,8 @@
         </p:nvSpPr>
         <p:spPr>
           <a:xfrm>
-            <a:off x="6668394" y="3728682"/>
-            <a:ext cx="211642" cy="163517"/>
+            <a:off x="10353742" y="4555266"/>
+            <a:ext cx="187850" cy="222450"/>
           </a:xfrm>
           <a:prstGeom prst="flowChartConnector">
             <a:avLst/>
@@ -7234,140 +7234,6 @@
       </p:grpSp>
       <p:grpSp>
         <p:nvGrpSpPr>
-          <p:cNvPr id="148" name="Group 147">
-            <a:extLst>
-              <a:ext uri="{FF2B5EF4-FFF2-40B4-BE49-F238E27FC236}">
-                <a16:creationId xmlns:a16="http://schemas.microsoft.com/office/drawing/2014/main" id="{385AC54E-E6D7-8D42-811A-52EF0042C50A}"/>
-              </a:ext>
-            </a:extLst>
-          </p:cNvPr>
-          <p:cNvGrpSpPr/>
-          <p:nvPr/>
-        </p:nvGrpSpPr>
-        <p:grpSpPr>
-          <a:xfrm rot="10800000">
-            <a:off x="10172765" y="4241038"/>
-            <a:ext cx="405051" cy="939439"/>
-            <a:chOff x="5428281" y="3837709"/>
-            <a:chExt cx="267346" cy="651279"/>
-          </a:xfrm>
-        </p:grpSpPr>
-        <p:cxnSp>
-          <p:nvCxnSpPr>
-            <p:cNvPr id="149" name="Straight Arrow Connector 148">
-              <a:extLst>
-                <a:ext uri="{FF2B5EF4-FFF2-40B4-BE49-F238E27FC236}">
-                  <a16:creationId xmlns:a16="http://schemas.microsoft.com/office/drawing/2014/main" id="{2FB97695-2C4C-994C-A3FC-E21AC509A8CE}"/>
-                </a:ext>
-              </a:extLst>
-            </p:cNvPr>
-            <p:cNvCxnSpPr/>
-            <p:nvPr/>
-          </p:nvCxnSpPr>
-          <p:spPr>
-            <a:xfrm>
-              <a:off x="5552770" y="3837709"/>
-              <a:ext cx="0" cy="651278"/>
-            </a:xfrm>
-            <a:prstGeom prst="straightConnector1">
-              <a:avLst/>
-            </a:prstGeom>
-            <a:ln w="28575">
-              <a:tailEnd type="none"/>
-            </a:ln>
-          </p:spPr>
-          <p:style>
-            <a:lnRef idx="1">
-              <a:schemeClr val="accent1"/>
-            </a:lnRef>
-            <a:fillRef idx="0">
-              <a:schemeClr val="accent1"/>
-            </a:fillRef>
-            <a:effectRef idx="0">
-              <a:schemeClr val="accent1"/>
-            </a:effectRef>
-            <a:fontRef idx="minor">
-              <a:schemeClr val="tx1"/>
-            </a:fontRef>
-          </p:style>
-        </p:cxnSp>
-        <p:cxnSp>
-          <p:nvCxnSpPr>
-            <p:cNvPr id="150" name="Straight Connector 149">
-              <a:extLst>
-                <a:ext uri="{FF2B5EF4-FFF2-40B4-BE49-F238E27FC236}">
-                  <a16:creationId xmlns:a16="http://schemas.microsoft.com/office/drawing/2014/main" id="{63C5C8FE-1127-794E-AD96-8984AFC0FCCE}"/>
-                </a:ext>
-              </a:extLst>
-            </p:cNvPr>
-            <p:cNvCxnSpPr/>
-            <p:nvPr/>
-          </p:nvCxnSpPr>
-          <p:spPr>
-            <a:xfrm flipH="1">
-              <a:off x="5428281" y="4331776"/>
-              <a:ext cx="123987" cy="157212"/>
-            </a:xfrm>
-            <a:prstGeom prst="line">
-              <a:avLst/>
-            </a:prstGeom>
-            <a:ln w="28575"/>
-          </p:spPr>
-          <p:style>
-            <a:lnRef idx="1">
-              <a:schemeClr val="accent1"/>
-            </a:lnRef>
-            <a:fillRef idx="0">
-              <a:schemeClr val="accent1"/>
-            </a:fillRef>
-            <a:effectRef idx="0">
-              <a:schemeClr val="accent1"/>
-            </a:effectRef>
-            <a:fontRef idx="minor">
-              <a:schemeClr val="tx1"/>
-            </a:fontRef>
-          </p:style>
-        </p:cxnSp>
-        <p:cxnSp>
-          <p:nvCxnSpPr>
-            <p:cNvPr id="151" name="Straight Connector 150">
-              <a:extLst>
-                <a:ext uri="{FF2B5EF4-FFF2-40B4-BE49-F238E27FC236}">
-                  <a16:creationId xmlns:a16="http://schemas.microsoft.com/office/drawing/2014/main" id="{3D310CCC-0B73-6B4F-985C-9A9F35C7818C}"/>
-                </a:ext>
-              </a:extLst>
-            </p:cNvPr>
-            <p:cNvCxnSpPr/>
-            <p:nvPr/>
-          </p:nvCxnSpPr>
-          <p:spPr>
-            <a:xfrm>
-              <a:off x="5552779" y="4324027"/>
-              <a:ext cx="142848" cy="164961"/>
-            </a:xfrm>
-            <a:prstGeom prst="line">
-              <a:avLst/>
-            </a:prstGeom>
-            <a:ln w="28575"/>
-          </p:spPr>
-          <p:style>
-            <a:lnRef idx="1">
-              <a:schemeClr val="accent1"/>
-            </a:lnRef>
-            <a:fillRef idx="0">
-              <a:schemeClr val="accent1"/>
-            </a:fillRef>
-            <a:effectRef idx="0">
-              <a:schemeClr val="accent1"/>
-            </a:effectRef>
-            <a:fontRef idx="minor">
-              <a:schemeClr val="tx1"/>
-            </a:fontRef>
-          </p:style>
-        </p:cxnSp>
-      </p:grpSp>
-      <p:grpSp>
-        <p:nvGrpSpPr>
           <p:cNvPr id="152" name="Group 151">
             <a:extLst>
               <a:ext uri="{FF2B5EF4-FFF2-40B4-BE49-F238E27FC236}">
@@ -7634,6 +7500,356 @@
           </p:style>
         </p:cxnSp>
       </p:grpSp>
+      <p:grpSp>
+        <p:nvGrpSpPr>
+          <p:cNvPr id="115" name="Group 114">
+            <a:extLst>
+              <a:ext uri="{FF2B5EF4-FFF2-40B4-BE49-F238E27FC236}">
+                <a16:creationId xmlns:a16="http://schemas.microsoft.com/office/drawing/2014/main" id="{FFD3959D-4F3B-9441-AB39-8E69329FD492}"/>
+              </a:ext>
+            </a:extLst>
+          </p:cNvPr>
+          <p:cNvGrpSpPr/>
+          <p:nvPr/>
+        </p:nvGrpSpPr>
+        <p:grpSpPr>
+          <a:xfrm rot="5400000">
+            <a:off x="6867568" y="3531663"/>
+            <a:ext cx="267346" cy="881726"/>
+            <a:chOff x="5428281" y="3837709"/>
+            <a:chExt cx="267346" cy="651279"/>
+          </a:xfrm>
+        </p:grpSpPr>
+        <p:cxnSp>
+          <p:nvCxnSpPr>
+            <p:cNvPr id="160" name="Straight Arrow Connector 159">
+              <a:extLst>
+                <a:ext uri="{FF2B5EF4-FFF2-40B4-BE49-F238E27FC236}">
+                  <a16:creationId xmlns:a16="http://schemas.microsoft.com/office/drawing/2014/main" id="{CBC38A91-97FB-C14C-8678-EA2EB44F64F0}"/>
+                </a:ext>
+              </a:extLst>
+            </p:cNvPr>
+            <p:cNvCxnSpPr/>
+            <p:nvPr/>
+          </p:nvCxnSpPr>
+          <p:spPr>
+            <a:xfrm>
+              <a:off x="5552770" y="3837709"/>
+              <a:ext cx="0" cy="651278"/>
+            </a:xfrm>
+            <a:prstGeom prst="straightConnector1">
+              <a:avLst/>
+            </a:prstGeom>
+            <a:ln w="28575">
+              <a:tailEnd type="none"/>
+            </a:ln>
+          </p:spPr>
+          <p:style>
+            <a:lnRef idx="1">
+              <a:schemeClr val="accent1"/>
+            </a:lnRef>
+            <a:fillRef idx="0">
+              <a:schemeClr val="accent1"/>
+            </a:fillRef>
+            <a:effectRef idx="0">
+              <a:schemeClr val="accent1"/>
+            </a:effectRef>
+            <a:fontRef idx="minor">
+              <a:schemeClr val="tx1"/>
+            </a:fontRef>
+          </p:style>
+        </p:cxnSp>
+        <p:cxnSp>
+          <p:nvCxnSpPr>
+            <p:cNvPr id="161" name="Straight Connector 160">
+              <a:extLst>
+                <a:ext uri="{FF2B5EF4-FFF2-40B4-BE49-F238E27FC236}">
+                  <a16:creationId xmlns:a16="http://schemas.microsoft.com/office/drawing/2014/main" id="{920562EE-7853-3C42-BFE1-24C8F4A82D99}"/>
+                </a:ext>
+              </a:extLst>
+            </p:cNvPr>
+            <p:cNvCxnSpPr/>
+            <p:nvPr/>
+          </p:nvCxnSpPr>
+          <p:spPr>
+            <a:xfrm flipH="1">
+              <a:off x="5428281" y="4331776"/>
+              <a:ext cx="123987" cy="157212"/>
+            </a:xfrm>
+            <a:prstGeom prst="line">
+              <a:avLst/>
+            </a:prstGeom>
+            <a:ln w="28575"/>
+          </p:spPr>
+          <p:style>
+            <a:lnRef idx="1">
+              <a:schemeClr val="accent1"/>
+            </a:lnRef>
+            <a:fillRef idx="0">
+              <a:schemeClr val="accent1"/>
+            </a:fillRef>
+            <a:effectRef idx="0">
+              <a:schemeClr val="accent1"/>
+            </a:effectRef>
+            <a:fontRef idx="minor">
+              <a:schemeClr val="tx1"/>
+            </a:fontRef>
+          </p:style>
+        </p:cxnSp>
+        <p:cxnSp>
+          <p:nvCxnSpPr>
+            <p:cNvPr id="162" name="Straight Connector 161">
+              <a:extLst>
+                <a:ext uri="{FF2B5EF4-FFF2-40B4-BE49-F238E27FC236}">
+                  <a16:creationId xmlns:a16="http://schemas.microsoft.com/office/drawing/2014/main" id="{F23DFFA2-FC2F-B346-A64C-05BF0039E41C}"/>
+                </a:ext>
+              </a:extLst>
+            </p:cNvPr>
+            <p:cNvCxnSpPr/>
+            <p:nvPr/>
+          </p:nvCxnSpPr>
+          <p:spPr>
+            <a:xfrm>
+              <a:off x="5552779" y="4324027"/>
+              <a:ext cx="142848" cy="164961"/>
+            </a:xfrm>
+            <a:prstGeom prst="line">
+              <a:avLst/>
+            </a:prstGeom>
+            <a:ln w="28575"/>
+          </p:spPr>
+          <p:style>
+            <a:lnRef idx="1">
+              <a:schemeClr val="accent1"/>
+            </a:lnRef>
+            <a:fillRef idx="0">
+              <a:schemeClr val="accent1"/>
+            </a:fillRef>
+            <a:effectRef idx="0">
+              <a:schemeClr val="accent1"/>
+            </a:effectRef>
+            <a:fontRef idx="minor">
+              <a:schemeClr val="tx1"/>
+            </a:fontRef>
+          </p:style>
+        </p:cxnSp>
+      </p:grpSp>
+      <p:sp>
+        <p:nvSpPr>
+          <p:cNvPr id="163" name="Flowchart: Connector 129">
+            <a:extLst>
+              <a:ext uri="{FF2B5EF4-FFF2-40B4-BE49-F238E27FC236}">
+                <a16:creationId xmlns:a16="http://schemas.microsoft.com/office/drawing/2014/main" id="{90BB5224-4E0A-D649-B143-0294F86B6A66}"/>
+              </a:ext>
+            </a:extLst>
+          </p:cNvPr>
+          <p:cNvSpPr/>
+          <p:nvPr/>
+        </p:nvSpPr>
+        <p:spPr>
+          <a:xfrm>
+            <a:off x="6820794" y="3881082"/>
+            <a:ext cx="211642" cy="163517"/>
+          </a:xfrm>
+          <a:prstGeom prst="flowChartConnector">
+            <a:avLst/>
+          </a:prstGeom>
+          <a:solidFill>
+            <a:schemeClr val="bg1"/>
+          </a:solidFill>
+          <a:ln w="28575">
+            <a:solidFill>
+              <a:schemeClr val="accent1"/>
+            </a:solidFill>
+          </a:ln>
+        </p:spPr>
+        <p:style>
+          <a:lnRef idx="2">
+            <a:schemeClr val="accent1">
+              <a:shade val="50000"/>
+            </a:schemeClr>
+          </a:lnRef>
+          <a:fillRef idx="1">
+            <a:schemeClr val="accent1"/>
+          </a:fillRef>
+          <a:effectRef idx="0">
+            <a:schemeClr val="accent1"/>
+          </a:effectRef>
+          <a:fontRef idx="minor">
+            <a:schemeClr val="lt1"/>
+          </a:fontRef>
+        </p:style>
+        <p:txBody>
+          <a:bodyPr rtlCol="0" anchor="ctr"/>
+          <a:lstStyle/>
+          <a:p>
+            <a:pPr algn="ctr"/>
+            <a:endParaRPr lang="en-GB"/>
+          </a:p>
+        </p:txBody>
+      </p:sp>
+      <p:sp>
+        <p:nvSpPr>
+          <p:cNvPr id="164" name="Flowchart: Connector 129">
+            <a:extLst>
+              <a:ext uri="{FF2B5EF4-FFF2-40B4-BE49-F238E27FC236}">
+                <a16:creationId xmlns:a16="http://schemas.microsoft.com/office/drawing/2014/main" id="{F02121F5-E059-DF42-A5B9-8FD2B9A8ADA0}"/>
+              </a:ext>
+            </a:extLst>
+          </p:cNvPr>
+          <p:cNvSpPr/>
+          <p:nvPr/>
+        </p:nvSpPr>
+        <p:spPr>
+          <a:xfrm rot="17975744">
+            <a:off x="8766945" y="2995385"/>
+            <a:ext cx="223035" cy="189628"/>
+          </a:xfrm>
+          <a:prstGeom prst="flowChartConnector">
+            <a:avLst/>
+          </a:prstGeom>
+          <a:solidFill>
+            <a:schemeClr val="bg1"/>
+          </a:solidFill>
+          <a:ln w="28575">
+            <a:solidFill>
+              <a:schemeClr val="accent1"/>
+            </a:solidFill>
+          </a:ln>
+        </p:spPr>
+        <p:style>
+          <a:lnRef idx="2">
+            <a:schemeClr val="accent1">
+              <a:shade val="50000"/>
+            </a:schemeClr>
+          </a:lnRef>
+          <a:fillRef idx="1">
+            <a:schemeClr val="accent1"/>
+          </a:fillRef>
+          <a:effectRef idx="0">
+            <a:schemeClr val="accent1"/>
+          </a:effectRef>
+          <a:fontRef idx="minor">
+            <a:schemeClr val="lt1"/>
+          </a:fontRef>
+        </p:style>
+        <p:txBody>
+          <a:bodyPr rtlCol="0" anchor="ctr"/>
+          <a:lstStyle/>
+          <a:p>
+            <a:pPr algn="ctr"/>
+            <a:endParaRPr lang="en-GB"/>
+          </a:p>
+        </p:txBody>
+      </p:sp>
+      <p:sp>
+        <p:nvSpPr>
+          <p:cNvPr id="165" name="Flowchart: Connector 129">
+            <a:extLst>
+              <a:ext uri="{FF2B5EF4-FFF2-40B4-BE49-F238E27FC236}">
+                <a16:creationId xmlns:a16="http://schemas.microsoft.com/office/drawing/2014/main" id="{9286F76D-FFF6-D948-8B7A-A1F790A7A342}"/>
+              </a:ext>
+            </a:extLst>
+          </p:cNvPr>
+          <p:cNvSpPr/>
+          <p:nvPr/>
+        </p:nvSpPr>
+        <p:spPr>
+          <a:xfrm rot="16200000">
+            <a:off x="8804282" y="571542"/>
+            <a:ext cx="187850" cy="222450"/>
+          </a:xfrm>
+          <a:prstGeom prst="flowChartConnector">
+            <a:avLst/>
+          </a:prstGeom>
+          <a:solidFill>
+            <a:schemeClr val="bg1"/>
+          </a:solidFill>
+          <a:ln w="28575">
+            <a:solidFill>
+              <a:schemeClr val="accent1"/>
+            </a:solidFill>
+          </a:ln>
+        </p:spPr>
+        <p:style>
+          <a:lnRef idx="2">
+            <a:schemeClr val="accent1">
+              <a:shade val="50000"/>
+            </a:schemeClr>
+          </a:lnRef>
+          <a:fillRef idx="1">
+            <a:schemeClr val="accent1"/>
+          </a:fillRef>
+          <a:effectRef idx="0">
+            <a:schemeClr val="accent1"/>
+          </a:effectRef>
+          <a:fontRef idx="minor">
+            <a:schemeClr val="lt1"/>
+          </a:fontRef>
+        </p:style>
+        <p:txBody>
+          <a:bodyPr rtlCol="0" anchor="ctr"/>
+          <a:lstStyle/>
+          <a:p>
+            <a:pPr algn="ctr"/>
+            <a:endParaRPr lang="en-GB"/>
+          </a:p>
+        </p:txBody>
+      </p:sp>
+      <p:sp>
+        <p:nvSpPr>
+          <p:cNvPr id="166" name="Flowchart: Connector 129">
+            <a:extLst>
+              <a:ext uri="{FF2B5EF4-FFF2-40B4-BE49-F238E27FC236}">
+                <a16:creationId xmlns:a16="http://schemas.microsoft.com/office/drawing/2014/main" id="{18A49128-A6DC-1847-AAB8-0D6822665443}"/>
+              </a:ext>
+            </a:extLst>
+          </p:cNvPr>
+          <p:cNvSpPr/>
+          <p:nvPr/>
+        </p:nvSpPr>
+        <p:spPr>
+          <a:xfrm rot="10460334">
+            <a:off x="8975671" y="3752614"/>
+            <a:ext cx="223035" cy="189628"/>
+          </a:xfrm>
+          <a:prstGeom prst="flowChartConnector">
+            <a:avLst/>
+          </a:prstGeom>
+          <a:solidFill>
+            <a:schemeClr val="bg1"/>
+          </a:solidFill>
+          <a:ln w="28575">
+            <a:solidFill>
+              <a:schemeClr val="accent1"/>
+            </a:solidFill>
+          </a:ln>
+        </p:spPr>
+        <p:style>
+          <a:lnRef idx="2">
+            <a:schemeClr val="accent1">
+              <a:shade val="50000"/>
+            </a:schemeClr>
+          </a:lnRef>
+          <a:fillRef idx="1">
+            <a:schemeClr val="accent1"/>
+          </a:fillRef>
+          <a:effectRef idx="0">
+            <a:schemeClr val="accent1"/>
+          </a:effectRef>
+          <a:fontRef idx="minor">
+            <a:schemeClr val="lt1"/>
+          </a:fontRef>
+        </p:style>
+        <p:txBody>
+          <a:bodyPr rtlCol="0" anchor="ctr"/>
+          <a:lstStyle/>
+          <a:p>
+            <a:pPr algn="ctr"/>
+            <a:endParaRPr lang="en-GB"/>
+          </a:p>
+        </p:txBody>
+      </p:sp>
     </p:spTree>
     <p:extLst>
       <p:ext uri="{BB962C8B-B14F-4D97-AF65-F5344CB8AC3E}">

</xml_diff>